<commit_message>
"Practicando cómo poner la portada"
</commit_message>
<xml_diff>
--- a/Presentación1.pptx
+++ b/Presentación1.pptx
@@ -6,6 +6,9 @@
   </p:sldMasterIdLst>
   <p:sldIdLst>
     <p:sldId id="257" r:id="rId2"/>
+    <p:sldId id="258" r:id="rId3"/>
+    <p:sldId id="259" r:id="rId4"/>
+    <p:sldId id="260" r:id="rId5"/>
   </p:sldIdLst>
   <p:sldSz cx="12192000" cy="6858000"/>
   <p:notesSz cx="6858000" cy="9144000"/>
@@ -104,7 +107,206 @@
       </a:defRPr>
     </a:lvl9pPr>
   </p:defaultTextStyle>
+  <p:extLst>
+    <p:ext uri="{EFAFB233-063F-42B5-8137-9DF3F51BA10A}">
+      <p15:sldGuideLst xmlns:p15="http://schemas.microsoft.com/office/powerpoint/2012/main"/>
+    </p:ext>
+  </p:extLst>
 </p:presentation>
+</file>
+
+<file path=ppt/changesInfos/changesInfo1.xml><?xml version="1.0" encoding="utf-8"?>
+<pc:chgInfo xmlns:a="http://schemas.openxmlformats.org/drawingml/2006/main" xmlns:r="http://schemas.openxmlformats.org/officeDocument/2006/relationships" xmlns:ac="http://schemas.microsoft.com/office/drawing/2013/main/command" xmlns:pc="http://schemas.microsoft.com/office/powerpoint/2013/main/command">
+  <pc:docChgLst>
+    <pc:chgData name="Paula MH" userId="28fd2089f52684aa" providerId="LiveId" clId="{53FBE7D5-95BE-4CDE-BFF1-28CEE387E25B}"/>
+    <pc:docChg chg="custSel addSld modSld">
+      <pc:chgData name="Paula MH" userId="28fd2089f52684aa" providerId="LiveId" clId="{53FBE7D5-95BE-4CDE-BFF1-28CEE387E25B}" dt="2022-04-25T17:50:56.874" v="216"/>
+      <pc:docMkLst>
+        <pc:docMk/>
+      </pc:docMkLst>
+      <pc:sldChg chg="addSp delSp modSp mod">
+        <pc:chgData name="Paula MH" userId="28fd2089f52684aa" providerId="LiveId" clId="{53FBE7D5-95BE-4CDE-BFF1-28CEE387E25B}" dt="2022-04-25T17:50:56.874" v="216"/>
+        <pc:sldMkLst>
+          <pc:docMk/>
+          <pc:sldMk cId="266880398" sldId="257"/>
+        </pc:sldMkLst>
+        <pc:spChg chg="add mod">
+          <ac:chgData name="Paula MH" userId="28fd2089f52684aa" providerId="LiveId" clId="{53FBE7D5-95BE-4CDE-BFF1-28CEE387E25B}" dt="2022-04-25T15:20:02.386" v="46" actId="1076"/>
+          <ac:spMkLst>
+            <pc:docMk/>
+            <pc:sldMk cId="266880398" sldId="257"/>
+            <ac:spMk id="2" creationId="{1B2B1FC4-E227-445C-8A32-3E1029CB1432}"/>
+          </ac:spMkLst>
+        </pc:spChg>
+        <pc:spChg chg="add mod ord">
+          <ac:chgData name="Paula MH" userId="28fd2089f52684aa" providerId="LiveId" clId="{53FBE7D5-95BE-4CDE-BFF1-28CEE387E25B}" dt="2022-04-25T15:37:21.342" v="61" actId="208"/>
+          <ac:spMkLst>
+            <pc:docMk/>
+            <pc:sldMk cId="266880398" sldId="257"/>
+            <ac:spMk id="3" creationId="{5D7FA6D7-8413-4196-973F-EC2047979F55}"/>
+          </ac:spMkLst>
+        </pc:spChg>
+        <pc:spChg chg="add mod">
+          <ac:chgData name="Paula MH" userId="28fd2089f52684aa" providerId="LiveId" clId="{53FBE7D5-95BE-4CDE-BFF1-28CEE387E25B}" dt="2022-04-25T15:42:22.802" v="190" actId="1076"/>
+          <ac:spMkLst>
+            <pc:docMk/>
+            <pc:sldMk cId="266880398" sldId="257"/>
+            <ac:spMk id="4" creationId="{E15F18AD-0E2B-4A3C-AB0E-3364FC9CF6E9}"/>
+          </ac:spMkLst>
+        </pc:spChg>
+        <pc:spChg chg="mod">
+          <ac:chgData name="Paula MH" userId="28fd2089f52684aa" providerId="LiveId" clId="{53FBE7D5-95BE-4CDE-BFF1-28CEE387E25B}" dt="2022-04-25T15:38:26.115" v="75" actId="1076"/>
+          <ac:spMkLst>
+            <pc:docMk/>
+            <pc:sldMk cId="266880398" sldId="257"/>
+            <ac:spMk id="7" creationId="{7CF5C6C3-C16C-4F33-9A2C-0D831A7C0181}"/>
+          </ac:spMkLst>
+        </pc:spChg>
+        <pc:spChg chg="add mod">
+          <ac:chgData name="Paula MH" userId="28fd2089f52684aa" providerId="LiveId" clId="{53FBE7D5-95BE-4CDE-BFF1-28CEE387E25B}" dt="2022-04-25T17:50:54.235" v="215" actId="1076"/>
+          <ac:spMkLst>
+            <pc:docMk/>
+            <pc:sldMk cId="266880398" sldId="257"/>
+            <ac:spMk id="8" creationId="{E20DDDF8-5BA6-4AB5-9F85-E3271998AE3B}"/>
+          </ac:spMkLst>
+        </pc:spChg>
+        <pc:spChg chg="add mod">
+          <ac:chgData name="Paula MH" userId="28fd2089f52684aa" providerId="LiveId" clId="{53FBE7D5-95BE-4CDE-BFF1-28CEE387E25B}" dt="2022-04-25T15:20:02.386" v="46" actId="1076"/>
+          <ac:spMkLst>
+            <pc:docMk/>
+            <pc:sldMk cId="266880398" sldId="257"/>
+            <ac:spMk id="13" creationId="{3A32CA42-BCBC-4754-9CC7-B8D778BC4C1F}"/>
+          </ac:spMkLst>
+        </pc:spChg>
+        <pc:spChg chg="del">
+          <ac:chgData name="Paula MH" userId="28fd2089f52684aa" providerId="LiveId" clId="{53FBE7D5-95BE-4CDE-BFF1-28CEE387E25B}" dt="2022-04-25T15:38:22.274" v="74" actId="478"/>
+          <ac:spMkLst>
+            <pc:docMk/>
+            <pc:sldMk cId="266880398" sldId="257"/>
+            <ac:spMk id="15" creationId="{F10612E0-C4F3-412E-98AB-857900A688E0}"/>
+          </ac:spMkLst>
+        </pc:spChg>
+        <pc:spChg chg="add mod">
+          <ac:chgData name="Paula MH" userId="28fd2089f52684aa" providerId="LiveId" clId="{53FBE7D5-95BE-4CDE-BFF1-28CEE387E25B}" dt="2022-04-25T15:20:02.386" v="46" actId="1076"/>
+          <ac:spMkLst>
+            <pc:docMk/>
+            <pc:sldMk cId="266880398" sldId="257"/>
+            <ac:spMk id="16" creationId="{B3FEAF7E-721B-4155-80CD-73E5812451B1}"/>
+          </ac:spMkLst>
+        </pc:spChg>
+        <pc:spChg chg="add mod">
+          <ac:chgData name="Paula MH" userId="28fd2089f52684aa" providerId="LiveId" clId="{53FBE7D5-95BE-4CDE-BFF1-28CEE387E25B}" dt="2022-04-25T15:36:23.999" v="52" actId="14100"/>
+          <ac:spMkLst>
+            <pc:docMk/>
+            <pc:sldMk cId="266880398" sldId="257"/>
+            <ac:spMk id="17" creationId="{8DBDEBF5-73A0-4EA9-AEC4-97DFA6C113E5}"/>
+          </ac:spMkLst>
+        </pc:spChg>
+        <pc:spChg chg="ord">
+          <ac:chgData name="Paula MH" userId="28fd2089f52684aa" providerId="LiveId" clId="{53FBE7D5-95BE-4CDE-BFF1-28CEE387E25B}" dt="2022-04-25T15:38:16.763" v="73" actId="167"/>
+          <ac:spMkLst>
+            <pc:docMk/>
+            <pc:sldMk cId="266880398" sldId="257"/>
+            <ac:spMk id="18" creationId="{F32E89A6-BE1D-4036-A951-ABFF245AA3AD}"/>
+          </ac:spMkLst>
+        </pc:spChg>
+        <pc:spChg chg="add mod">
+          <ac:chgData name="Paula MH" userId="28fd2089f52684aa" providerId="LiveId" clId="{53FBE7D5-95BE-4CDE-BFF1-28CEE387E25B}" dt="2022-04-25T15:36:42.254" v="55" actId="14100"/>
+          <ac:spMkLst>
+            <pc:docMk/>
+            <pc:sldMk cId="266880398" sldId="257"/>
+            <ac:spMk id="19" creationId="{2159F812-848A-4348-9E2D-B3DABD446E4D}"/>
+          </ac:spMkLst>
+        </pc:spChg>
+        <pc:spChg chg="add mod ord">
+          <ac:chgData name="Paula MH" userId="28fd2089f52684aa" providerId="LiveId" clId="{53FBE7D5-95BE-4CDE-BFF1-28CEE387E25B}" dt="2022-04-25T15:37:33.206" v="64" actId="167"/>
+          <ac:spMkLst>
+            <pc:docMk/>
+            <pc:sldMk cId="266880398" sldId="257"/>
+            <ac:spMk id="20" creationId="{C95F473E-6830-4BF9-9638-DE81125B59C7}"/>
+          </ac:spMkLst>
+        </pc:spChg>
+        <pc:spChg chg="add mod ord">
+          <ac:chgData name="Paula MH" userId="28fd2089f52684aa" providerId="LiveId" clId="{53FBE7D5-95BE-4CDE-BFF1-28CEE387E25B}" dt="2022-04-25T15:37:54.685" v="68" actId="167"/>
+          <ac:spMkLst>
+            <pc:docMk/>
+            <pc:sldMk cId="266880398" sldId="257"/>
+            <ac:spMk id="21" creationId="{BF2B8962-9863-4AFA-96D6-5BE969FBEDF7}"/>
+          </ac:spMkLst>
+        </pc:spChg>
+        <pc:spChg chg="add mod ord">
+          <ac:chgData name="Paula MH" userId="28fd2089f52684aa" providerId="LiveId" clId="{53FBE7D5-95BE-4CDE-BFF1-28CEE387E25B}" dt="2022-04-25T15:38:13.691" v="72" actId="167"/>
+          <ac:spMkLst>
+            <pc:docMk/>
+            <pc:sldMk cId="266880398" sldId="257"/>
+            <ac:spMk id="22" creationId="{59D208F6-31F4-4173-AD06-17DA9E9EC62B}"/>
+          </ac:spMkLst>
+        </pc:spChg>
+        <pc:spChg chg="add mod">
+          <ac:chgData name="Paula MH" userId="28fd2089f52684aa" providerId="LiveId" clId="{53FBE7D5-95BE-4CDE-BFF1-28CEE387E25B}" dt="2022-04-25T17:50:56.874" v="216"/>
+          <ac:spMkLst>
+            <pc:docMk/>
+            <pc:sldMk cId="266880398" sldId="257"/>
+            <ac:spMk id="23" creationId="{1F8DFEC2-2CFC-45D3-A1FE-9A4D4952FF33}"/>
+          </ac:spMkLst>
+        </pc:spChg>
+        <pc:picChg chg="add mod ord">
+          <ac:chgData name="Paula MH" userId="28fd2089f52684aa" providerId="LiveId" clId="{53FBE7D5-95BE-4CDE-BFF1-28CEE387E25B}" dt="2022-04-25T15:42:22.802" v="190" actId="1076"/>
+          <ac:picMkLst>
+            <pc:docMk/>
+            <pc:sldMk cId="266880398" sldId="257"/>
+            <ac:picMk id="6" creationId="{9F6754B4-C9C9-4A6E-9A4F-C855EFD086DD}"/>
+          </ac:picMkLst>
+        </pc:picChg>
+      </pc:sldChg>
+      <pc:sldChg chg="addSp new mod">
+        <pc:chgData name="Paula MH" userId="28fd2089f52684aa" providerId="LiveId" clId="{53FBE7D5-95BE-4CDE-BFF1-28CEE387E25B}" dt="2022-04-25T15:18:48.597" v="1" actId="22"/>
+        <pc:sldMkLst>
+          <pc:docMk/>
+          <pc:sldMk cId="2229508293" sldId="258"/>
+        </pc:sldMkLst>
+        <pc:picChg chg="add">
+          <ac:chgData name="Paula MH" userId="28fd2089f52684aa" providerId="LiveId" clId="{53FBE7D5-95BE-4CDE-BFF1-28CEE387E25B}" dt="2022-04-25T15:18:48.597" v="1" actId="22"/>
+          <ac:picMkLst>
+            <pc:docMk/>
+            <pc:sldMk cId="2229508293" sldId="258"/>
+            <ac:picMk id="3" creationId="{F5F2A04A-8D41-4C48-9816-386F1448D505}"/>
+          </ac:picMkLst>
+        </pc:picChg>
+      </pc:sldChg>
+      <pc:sldChg chg="addSp new mod">
+        <pc:chgData name="Paula MH" userId="28fd2089f52684aa" providerId="LiveId" clId="{53FBE7D5-95BE-4CDE-BFF1-28CEE387E25B}" dt="2022-04-25T15:30:53.542" v="48" actId="22"/>
+        <pc:sldMkLst>
+          <pc:docMk/>
+          <pc:sldMk cId="4206286501" sldId="259"/>
+        </pc:sldMkLst>
+        <pc:spChg chg="add">
+          <ac:chgData name="Paula MH" userId="28fd2089f52684aa" providerId="LiveId" clId="{53FBE7D5-95BE-4CDE-BFF1-28CEE387E25B}" dt="2022-04-25T15:30:53.542" v="48" actId="22"/>
+          <ac:spMkLst>
+            <pc:docMk/>
+            <pc:sldMk cId="4206286501" sldId="259"/>
+            <ac:spMk id="3" creationId="{7043C214-05A4-4605-9A3A-3C2C76CFBA33}"/>
+          </ac:spMkLst>
+        </pc:spChg>
+      </pc:sldChg>
+      <pc:sldChg chg="addSp new mod">
+        <pc:chgData name="Paula MH" userId="28fd2089f52684aa" providerId="LiveId" clId="{53FBE7D5-95BE-4CDE-BFF1-28CEE387E25B}" dt="2022-04-25T15:31:24.461" v="50" actId="22"/>
+        <pc:sldMkLst>
+          <pc:docMk/>
+          <pc:sldMk cId="813271363" sldId="260"/>
+        </pc:sldMkLst>
+        <pc:picChg chg="add">
+          <ac:chgData name="Paula MH" userId="28fd2089f52684aa" providerId="LiveId" clId="{53FBE7D5-95BE-4CDE-BFF1-28CEE387E25B}" dt="2022-04-25T15:31:24.461" v="50" actId="22"/>
+          <ac:picMkLst>
+            <pc:docMk/>
+            <pc:sldMk cId="813271363" sldId="260"/>
+            <ac:picMk id="3" creationId="{B6096502-2A9C-45CA-8873-1D77929A210E}"/>
+          </ac:picMkLst>
+        </pc:picChg>
+      </pc:sldChg>
+    </pc:docChg>
+  </pc:docChgLst>
+</pc:chgInfo>
 </file>
 
 <file path=ppt/slideLayouts/slideLayout1.xml><?xml version="1.0" encoding="utf-8"?>
@@ -254,7 +456,7 @@
           <a:p>
             <a:fld id="{58943FA6-1F0B-4FCB-A92C-BFC95ED638A9}" type="datetimeFigureOut">
               <a:rPr lang="es-ES" smtClean="0"/>
-              <a:t>31/03/2022</a:t>
+              <a:t>25/04/2022</a:t>
             </a:fld>
             <a:endParaRPr lang="es-ES"/>
           </a:p>
@@ -452,7 +654,7 @@
           <a:p>
             <a:fld id="{58943FA6-1F0B-4FCB-A92C-BFC95ED638A9}" type="datetimeFigureOut">
               <a:rPr lang="es-ES" smtClean="0"/>
-              <a:t>31/03/2022</a:t>
+              <a:t>25/04/2022</a:t>
             </a:fld>
             <a:endParaRPr lang="es-ES"/>
           </a:p>
@@ -660,7 +862,7 @@
           <a:p>
             <a:fld id="{58943FA6-1F0B-4FCB-A92C-BFC95ED638A9}" type="datetimeFigureOut">
               <a:rPr lang="es-ES" smtClean="0"/>
-              <a:t>31/03/2022</a:t>
+              <a:t>25/04/2022</a:t>
             </a:fld>
             <a:endParaRPr lang="es-ES"/>
           </a:p>
@@ -858,7 +1060,7 @@
           <a:p>
             <a:fld id="{58943FA6-1F0B-4FCB-A92C-BFC95ED638A9}" type="datetimeFigureOut">
               <a:rPr lang="es-ES" smtClean="0"/>
-              <a:t>31/03/2022</a:t>
+              <a:t>25/04/2022</a:t>
             </a:fld>
             <a:endParaRPr lang="es-ES"/>
           </a:p>
@@ -1133,7 +1335,7 @@
           <a:p>
             <a:fld id="{58943FA6-1F0B-4FCB-A92C-BFC95ED638A9}" type="datetimeFigureOut">
               <a:rPr lang="es-ES" smtClean="0"/>
-              <a:t>31/03/2022</a:t>
+              <a:t>25/04/2022</a:t>
             </a:fld>
             <a:endParaRPr lang="es-ES"/>
           </a:p>
@@ -1398,7 +1600,7 @@
           <a:p>
             <a:fld id="{58943FA6-1F0B-4FCB-A92C-BFC95ED638A9}" type="datetimeFigureOut">
               <a:rPr lang="es-ES" smtClean="0"/>
-              <a:t>31/03/2022</a:t>
+              <a:t>25/04/2022</a:t>
             </a:fld>
             <a:endParaRPr lang="es-ES"/>
           </a:p>
@@ -1810,7 +2012,7 @@
           <a:p>
             <a:fld id="{58943FA6-1F0B-4FCB-A92C-BFC95ED638A9}" type="datetimeFigureOut">
               <a:rPr lang="es-ES" smtClean="0"/>
-              <a:t>31/03/2022</a:t>
+              <a:t>25/04/2022</a:t>
             </a:fld>
             <a:endParaRPr lang="es-ES"/>
           </a:p>
@@ -1951,7 +2153,7 @@
           <a:p>
             <a:fld id="{58943FA6-1F0B-4FCB-A92C-BFC95ED638A9}" type="datetimeFigureOut">
               <a:rPr lang="es-ES" smtClean="0"/>
-              <a:t>31/03/2022</a:t>
+              <a:t>25/04/2022</a:t>
             </a:fld>
             <a:endParaRPr lang="es-ES"/>
           </a:p>
@@ -2064,7 +2266,7 @@
           <a:p>
             <a:fld id="{58943FA6-1F0B-4FCB-A92C-BFC95ED638A9}" type="datetimeFigureOut">
               <a:rPr lang="es-ES" smtClean="0"/>
-              <a:t>31/03/2022</a:t>
+              <a:t>25/04/2022</a:t>
             </a:fld>
             <a:endParaRPr lang="es-ES"/>
           </a:p>
@@ -2375,7 +2577,7 @@
           <a:p>
             <a:fld id="{58943FA6-1F0B-4FCB-A92C-BFC95ED638A9}" type="datetimeFigureOut">
               <a:rPr lang="es-ES" smtClean="0"/>
-              <a:t>31/03/2022</a:t>
+              <a:t>25/04/2022</a:t>
             </a:fld>
             <a:endParaRPr lang="es-ES"/>
           </a:p>
@@ -2663,7 +2865,7 @@
           <a:p>
             <a:fld id="{58943FA6-1F0B-4FCB-A92C-BFC95ED638A9}" type="datetimeFigureOut">
               <a:rPr lang="es-ES" smtClean="0"/>
-              <a:t>31/03/2022</a:t>
+              <a:t>25/04/2022</a:t>
             </a:fld>
             <a:endParaRPr lang="es-ES"/>
           </a:p>
@@ -2904,7 +3106,7 @@
           <a:p>
             <a:fld id="{58943FA6-1F0B-4FCB-A92C-BFC95ED638A9}" type="datetimeFigureOut">
               <a:rPr lang="es-ES" smtClean="0"/>
-              <a:t>31/03/2022</a:t>
+              <a:t>25/04/2022</a:t>
             </a:fld>
             <a:endParaRPr lang="es-ES"/>
           </a:p>
@@ -3375,6 +3577,206 @@
       </p:sp>
       <p:sp>
         <p:nvSpPr>
+          <p:cNvPr id="22" name="Elipse 21">
+            <a:extLst>
+              <a:ext uri="{FF2B5EF4-FFF2-40B4-BE49-F238E27FC236}">
+                <a16:creationId xmlns:a16="http://schemas.microsoft.com/office/drawing/2014/main" id="{59D208F6-31F4-4173-AD06-17DA9E9EC62B}"/>
+              </a:ext>
+            </a:extLst>
+          </p:cNvPr>
+          <p:cNvSpPr/>
+          <p:nvPr/>
+        </p:nvSpPr>
+        <p:spPr>
+          <a:xfrm>
+            <a:off x="8054237" y="3900792"/>
+            <a:ext cx="2275900" cy="2397604"/>
+          </a:xfrm>
+          <a:prstGeom prst="ellipse">
+            <a:avLst/>
+          </a:prstGeom>
+          <a:noFill/>
+          <a:ln>
+            <a:solidFill>
+              <a:schemeClr val="accent2"/>
+            </a:solidFill>
+          </a:ln>
+        </p:spPr>
+        <p:style>
+          <a:lnRef idx="2">
+            <a:schemeClr val="accent4"/>
+          </a:lnRef>
+          <a:fillRef idx="1">
+            <a:schemeClr val="lt1"/>
+          </a:fillRef>
+          <a:effectRef idx="0">
+            <a:schemeClr val="accent4"/>
+          </a:effectRef>
+          <a:fontRef idx="minor">
+            <a:schemeClr val="dk1"/>
+          </a:fontRef>
+        </p:style>
+        <p:txBody>
+          <a:bodyPr rtlCol="0" anchor="ctr"/>
+          <a:lstStyle/>
+          <a:p>
+            <a:pPr algn="ctr"/>
+            <a:endParaRPr lang="es-ES"/>
+          </a:p>
+        </p:txBody>
+      </p:sp>
+      <p:sp>
+        <p:nvSpPr>
+          <p:cNvPr id="21" name="Elipse 20">
+            <a:extLst>
+              <a:ext uri="{FF2B5EF4-FFF2-40B4-BE49-F238E27FC236}">
+                <a16:creationId xmlns:a16="http://schemas.microsoft.com/office/drawing/2014/main" id="{BF2B8962-9863-4AFA-96D6-5BE969FBEDF7}"/>
+              </a:ext>
+            </a:extLst>
+          </p:cNvPr>
+          <p:cNvSpPr/>
+          <p:nvPr/>
+        </p:nvSpPr>
+        <p:spPr>
+          <a:xfrm>
+            <a:off x="7901837" y="4017944"/>
+            <a:ext cx="2244840" cy="2128051"/>
+          </a:xfrm>
+          <a:prstGeom prst="ellipse">
+            <a:avLst/>
+          </a:prstGeom>
+          <a:noFill/>
+          <a:ln>
+            <a:solidFill>
+              <a:schemeClr val="accent2"/>
+            </a:solidFill>
+          </a:ln>
+        </p:spPr>
+        <p:style>
+          <a:lnRef idx="2">
+            <a:schemeClr val="accent4"/>
+          </a:lnRef>
+          <a:fillRef idx="1">
+            <a:schemeClr val="lt1"/>
+          </a:fillRef>
+          <a:effectRef idx="0">
+            <a:schemeClr val="accent4"/>
+          </a:effectRef>
+          <a:fontRef idx="minor">
+            <a:schemeClr val="dk1"/>
+          </a:fontRef>
+        </p:style>
+        <p:txBody>
+          <a:bodyPr rtlCol="0" anchor="ctr"/>
+          <a:lstStyle/>
+          <a:p>
+            <a:pPr algn="ctr"/>
+            <a:endParaRPr lang="es-ES"/>
+          </a:p>
+        </p:txBody>
+      </p:sp>
+      <p:sp>
+        <p:nvSpPr>
+          <p:cNvPr id="20" name="Elipse 19">
+            <a:extLst>
+              <a:ext uri="{FF2B5EF4-FFF2-40B4-BE49-F238E27FC236}">
+                <a16:creationId xmlns:a16="http://schemas.microsoft.com/office/drawing/2014/main" id="{C95F473E-6830-4BF9-9638-DE81125B59C7}"/>
+              </a:ext>
+            </a:extLst>
+          </p:cNvPr>
+          <p:cNvSpPr/>
+          <p:nvPr/>
+        </p:nvSpPr>
+        <p:spPr>
+          <a:xfrm>
+            <a:off x="2496500" y="2681939"/>
+            <a:ext cx="2244840" cy="2128051"/>
+          </a:xfrm>
+          <a:prstGeom prst="ellipse">
+            <a:avLst/>
+          </a:prstGeom>
+          <a:noFill/>
+          <a:ln>
+            <a:solidFill>
+              <a:schemeClr val="accent2"/>
+            </a:solidFill>
+          </a:ln>
+        </p:spPr>
+        <p:style>
+          <a:lnRef idx="2">
+            <a:schemeClr val="accent4"/>
+          </a:lnRef>
+          <a:fillRef idx="1">
+            <a:schemeClr val="lt1"/>
+          </a:fillRef>
+          <a:effectRef idx="0">
+            <a:schemeClr val="accent4"/>
+          </a:effectRef>
+          <a:fontRef idx="minor">
+            <a:schemeClr val="dk1"/>
+          </a:fontRef>
+        </p:style>
+        <p:txBody>
+          <a:bodyPr rtlCol="0" anchor="ctr"/>
+          <a:lstStyle/>
+          <a:p>
+            <a:pPr algn="ctr"/>
+            <a:endParaRPr lang="es-ES"/>
+          </a:p>
+        </p:txBody>
+      </p:sp>
+      <p:sp>
+        <p:nvSpPr>
+          <p:cNvPr id="3" name="Elipse 2">
+            <a:extLst>
+              <a:ext uri="{FF2B5EF4-FFF2-40B4-BE49-F238E27FC236}">
+                <a16:creationId xmlns:a16="http://schemas.microsoft.com/office/drawing/2014/main" id="{5D7FA6D7-8413-4196-973F-EC2047979F55}"/>
+              </a:ext>
+            </a:extLst>
+          </p:cNvPr>
+          <p:cNvSpPr/>
+          <p:nvPr/>
+        </p:nvSpPr>
+        <p:spPr>
+          <a:xfrm>
+            <a:off x="2519464" y="2402732"/>
+            <a:ext cx="2244840" cy="2128051"/>
+          </a:xfrm>
+          <a:prstGeom prst="ellipse">
+            <a:avLst/>
+          </a:prstGeom>
+          <a:noFill/>
+          <a:ln>
+            <a:solidFill>
+              <a:schemeClr val="accent2"/>
+            </a:solidFill>
+          </a:ln>
+        </p:spPr>
+        <p:style>
+          <a:lnRef idx="2">
+            <a:schemeClr val="accent4"/>
+          </a:lnRef>
+          <a:fillRef idx="1">
+            <a:schemeClr val="lt1"/>
+          </a:fillRef>
+          <a:effectRef idx="0">
+            <a:schemeClr val="accent4"/>
+          </a:effectRef>
+          <a:fontRef idx="minor">
+            <a:schemeClr val="dk1"/>
+          </a:fontRef>
+        </p:style>
+        <p:txBody>
+          <a:bodyPr rtlCol="0" anchor="ctr"/>
+          <a:lstStyle/>
+          <a:p>
+            <a:pPr algn="ctr"/>
+            <a:endParaRPr lang="es-ES"/>
+          </a:p>
+        </p:txBody>
+      </p:sp>
+      <p:sp>
+        <p:nvSpPr>
           <p:cNvPr id="10" name="Elipse 9">
             <a:extLst>
               <a:ext uri="{FF2B5EF4-FFF2-40B4-BE49-F238E27FC236}">
@@ -3573,63 +3975,19 @@
       </p:sp>
       <p:sp>
         <p:nvSpPr>
-          <p:cNvPr id="15" name="Elipse 14">
-            <a:extLst>
-              <a:ext uri="{FF2B5EF4-FFF2-40B4-BE49-F238E27FC236}">
-                <a16:creationId xmlns:a16="http://schemas.microsoft.com/office/drawing/2014/main" id="{F10612E0-C4F3-412E-98AB-857900A688E0}"/>
-              </a:ext>
-            </a:extLst>
-          </p:cNvPr>
-          <p:cNvSpPr/>
+          <p:cNvPr id="7" name="CuadroTexto 6">
+            <a:extLst>
+              <a:ext uri="{FF2B5EF4-FFF2-40B4-BE49-F238E27FC236}">
+                <a16:creationId xmlns:a16="http://schemas.microsoft.com/office/drawing/2014/main" id="{7CF5C6C3-C16C-4F33-9A2C-0D831A7C0181}"/>
+              </a:ext>
+            </a:extLst>
+          </p:cNvPr>
+          <p:cNvSpPr txBox="1"/>
           <p:nvPr/>
         </p:nvSpPr>
         <p:spPr>
           <a:xfrm>
-            <a:off x="7504577" y="241956"/>
-            <a:ext cx="1143895" cy="953271"/>
-          </a:xfrm>
-          <a:prstGeom prst="ellipse">
-            <a:avLst/>
-          </a:prstGeom>
-        </p:spPr>
-        <p:style>
-          <a:lnRef idx="2">
-            <a:schemeClr val="accent2"/>
-          </a:lnRef>
-          <a:fillRef idx="1">
-            <a:schemeClr val="lt1"/>
-          </a:fillRef>
-          <a:effectRef idx="0">
-            <a:schemeClr val="accent2"/>
-          </a:effectRef>
-          <a:fontRef idx="minor">
-            <a:schemeClr val="dk1"/>
-          </a:fontRef>
-        </p:style>
-        <p:txBody>
-          <a:bodyPr rtlCol="0" anchor="ctr"/>
-          <a:lstStyle/>
-          <a:p>
-            <a:pPr algn="ctr"/>
-            <a:endParaRPr lang="es-ES"/>
-          </a:p>
-        </p:txBody>
-      </p:sp>
-      <p:sp>
-        <p:nvSpPr>
-          <p:cNvPr id="7" name="CuadroTexto 6">
-            <a:extLst>
-              <a:ext uri="{FF2B5EF4-FFF2-40B4-BE49-F238E27FC236}">
-                <a16:creationId xmlns:a16="http://schemas.microsoft.com/office/drawing/2014/main" id="{7CF5C6C3-C16C-4F33-9A2C-0D831A7C0181}"/>
-              </a:ext>
-            </a:extLst>
-          </p:cNvPr>
-          <p:cNvSpPr txBox="1"/>
-          <p:nvPr/>
-        </p:nvSpPr>
-        <p:spPr>
-          <a:xfrm>
-            <a:off x="4008582" y="241957"/>
+            <a:off x="4142021" y="298524"/>
             <a:ext cx="4174836" cy="1107996"/>
           </a:xfrm>
           <a:prstGeom prst="rect">
@@ -3677,10 +4035,612 @@
           </a:p>
         </p:txBody>
       </p:sp>
+      <p:sp>
+        <p:nvSpPr>
+          <p:cNvPr id="2" name="Rectángulo 1">
+            <a:extLst>
+              <a:ext uri="{FF2B5EF4-FFF2-40B4-BE49-F238E27FC236}">
+                <a16:creationId xmlns:a16="http://schemas.microsoft.com/office/drawing/2014/main" id="{1B2B1FC4-E227-445C-8A32-3E1029CB1432}"/>
+              </a:ext>
+            </a:extLst>
+          </p:cNvPr>
+          <p:cNvSpPr/>
+          <p:nvPr/>
+        </p:nvSpPr>
+        <p:spPr>
+          <a:xfrm>
+            <a:off x="1799617" y="3115523"/>
+            <a:ext cx="1488332" cy="2636196"/>
+          </a:xfrm>
+          <a:prstGeom prst="rect">
+            <a:avLst/>
+          </a:prstGeom>
+        </p:spPr>
+        <p:style>
+          <a:lnRef idx="2">
+            <a:schemeClr val="accent1">
+              <a:shade val="50000"/>
+            </a:schemeClr>
+          </a:lnRef>
+          <a:fillRef idx="1">
+            <a:schemeClr val="accent1"/>
+          </a:fillRef>
+          <a:effectRef idx="0">
+            <a:schemeClr val="accent1"/>
+          </a:effectRef>
+          <a:fontRef idx="minor">
+            <a:schemeClr val="lt1"/>
+          </a:fontRef>
+        </p:style>
+        <p:txBody>
+          <a:bodyPr rtlCol="0" anchor="ctr"/>
+          <a:lstStyle/>
+          <a:p>
+            <a:pPr algn="ctr"/>
+            <a:endParaRPr lang="es-ES"/>
+          </a:p>
+        </p:txBody>
+      </p:sp>
+      <p:sp>
+        <p:nvSpPr>
+          <p:cNvPr id="13" name="Rectángulo 12">
+            <a:extLst>
+              <a:ext uri="{FF2B5EF4-FFF2-40B4-BE49-F238E27FC236}">
+                <a16:creationId xmlns:a16="http://schemas.microsoft.com/office/drawing/2014/main" id="{3A32CA42-BCBC-4754-9CC7-B8D778BC4C1F}"/>
+              </a:ext>
+            </a:extLst>
+          </p:cNvPr>
+          <p:cNvSpPr/>
+          <p:nvPr/>
+        </p:nvSpPr>
+        <p:spPr>
+          <a:xfrm>
+            <a:off x="3387475" y="3114474"/>
+            <a:ext cx="2244840" cy="2636196"/>
+          </a:xfrm>
+          <a:prstGeom prst="rect">
+            <a:avLst/>
+          </a:prstGeom>
+        </p:spPr>
+        <p:style>
+          <a:lnRef idx="2">
+            <a:schemeClr val="accent1">
+              <a:shade val="50000"/>
+            </a:schemeClr>
+          </a:lnRef>
+          <a:fillRef idx="1">
+            <a:schemeClr val="accent1"/>
+          </a:fillRef>
+          <a:effectRef idx="0">
+            <a:schemeClr val="accent1"/>
+          </a:effectRef>
+          <a:fontRef idx="minor">
+            <a:schemeClr val="lt1"/>
+          </a:fontRef>
+        </p:style>
+        <p:txBody>
+          <a:bodyPr rtlCol="0" anchor="ctr"/>
+          <a:lstStyle/>
+          <a:p>
+            <a:pPr algn="ctr"/>
+            <a:endParaRPr lang="es-ES"/>
+          </a:p>
+        </p:txBody>
+      </p:sp>
+      <p:sp>
+        <p:nvSpPr>
+          <p:cNvPr id="16" name="Rectángulo 15">
+            <a:extLst>
+              <a:ext uri="{FF2B5EF4-FFF2-40B4-BE49-F238E27FC236}">
+                <a16:creationId xmlns:a16="http://schemas.microsoft.com/office/drawing/2014/main" id="{B3FEAF7E-721B-4155-80CD-73E5812451B1}"/>
+              </a:ext>
+            </a:extLst>
+          </p:cNvPr>
+          <p:cNvSpPr/>
+          <p:nvPr/>
+        </p:nvSpPr>
+        <p:spPr>
+          <a:xfrm>
+            <a:off x="5671223" y="1974716"/>
+            <a:ext cx="1116432" cy="1107997"/>
+          </a:xfrm>
+          <a:prstGeom prst="rect">
+            <a:avLst/>
+          </a:prstGeom>
+        </p:spPr>
+        <p:style>
+          <a:lnRef idx="2">
+            <a:schemeClr val="accent1">
+              <a:shade val="50000"/>
+            </a:schemeClr>
+          </a:lnRef>
+          <a:fillRef idx="1">
+            <a:schemeClr val="accent1"/>
+          </a:fillRef>
+          <a:effectRef idx="0">
+            <a:schemeClr val="accent1"/>
+          </a:effectRef>
+          <a:fontRef idx="minor">
+            <a:schemeClr val="lt1"/>
+          </a:fontRef>
+        </p:style>
+        <p:txBody>
+          <a:bodyPr rtlCol="0" anchor="ctr"/>
+          <a:lstStyle/>
+          <a:p>
+            <a:pPr algn="ctr"/>
+            <a:endParaRPr lang="es-ES"/>
+          </a:p>
+        </p:txBody>
+      </p:sp>
+      <p:sp>
+        <p:nvSpPr>
+          <p:cNvPr id="17" name="Rectángulo 16">
+            <a:extLst>
+              <a:ext uri="{FF2B5EF4-FFF2-40B4-BE49-F238E27FC236}">
+                <a16:creationId xmlns:a16="http://schemas.microsoft.com/office/drawing/2014/main" id="{8DBDEBF5-73A0-4EA9-AEC4-97DFA6C113E5}"/>
+              </a:ext>
+            </a:extLst>
+          </p:cNvPr>
+          <p:cNvSpPr/>
+          <p:nvPr/>
+        </p:nvSpPr>
+        <p:spPr>
+          <a:xfrm>
+            <a:off x="6910823" y="1974716"/>
+            <a:ext cx="2709831" cy="2556067"/>
+          </a:xfrm>
+          <a:prstGeom prst="rect">
+            <a:avLst/>
+          </a:prstGeom>
+        </p:spPr>
+        <p:style>
+          <a:lnRef idx="2">
+            <a:schemeClr val="accent1">
+              <a:shade val="50000"/>
+            </a:schemeClr>
+          </a:lnRef>
+          <a:fillRef idx="1">
+            <a:schemeClr val="accent1"/>
+          </a:fillRef>
+          <a:effectRef idx="0">
+            <a:schemeClr val="accent1"/>
+          </a:effectRef>
+          <a:fontRef idx="minor">
+            <a:schemeClr val="lt1"/>
+          </a:fontRef>
+        </p:style>
+        <p:txBody>
+          <a:bodyPr rtlCol="0" anchor="ctr"/>
+          <a:lstStyle/>
+          <a:p>
+            <a:pPr algn="ctr"/>
+            <a:endParaRPr lang="es-ES"/>
+          </a:p>
+        </p:txBody>
+      </p:sp>
+      <p:sp>
+        <p:nvSpPr>
+          <p:cNvPr id="19" name="Rectángulo 18">
+            <a:extLst>
+              <a:ext uri="{FF2B5EF4-FFF2-40B4-BE49-F238E27FC236}">
+                <a16:creationId xmlns:a16="http://schemas.microsoft.com/office/drawing/2014/main" id="{2159F812-848A-4348-9E2D-B3DABD446E4D}"/>
+              </a:ext>
+            </a:extLst>
+          </p:cNvPr>
+          <p:cNvSpPr/>
+          <p:nvPr/>
+        </p:nvSpPr>
+        <p:spPr>
+          <a:xfrm>
+            <a:off x="6910823" y="4654761"/>
+            <a:ext cx="2709831" cy="1095910"/>
+          </a:xfrm>
+          <a:prstGeom prst="rect">
+            <a:avLst/>
+          </a:prstGeom>
+        </p:spPr>
+        <p:style>
+          <a:lnRef idx="2">
+            <a:schemeClr val="accent1">
+              <a:shade val="50000"/>
+            </a:schemeClr>
+          </a:lnRef>
+          <a:fillRef idx="1">
+            <a:schemeClr val="accent1"/>
+          </a:fillRef>
+          <a:effectRef idx="0">
+            <a:schemeClr val="accent1"/>
+          </a:effectRef>
+          <a:fontRef idx="minor">
+            <a:schemeClr val="lt1"/>
+          </a:fontRef>
+        </p:style>
+        <p:txBody>
+          <a:bodyPr rtlCol="0" anchor="ctr"/>
+          <a:lstStyle/>
+          <a:p>
+            <a:pPr algn="ctr"/>
+            <a:endParaRPr lang="es-ES"/>
+          </a:p>
+        </p:txBody>
+      </p:sp>
+      <p:sp>
+        <p:nvSpPr>
+          <p:cNvPr id="4" name="CuadroTexto 3">
+            <a:extLst>
+              <a:ext uri="{FF2B5EF4-FFF2-40B4-BE49-F238E27FC236}">
+                <a16:creationId xmlns:a16="http://schemas.microsoft.com/office/drawing/2014/main" id="{E15F18AD-0E2B-4A3C-AB0E-3364FC9CF6E9}"/>
+              </a:ext>
+            </a:extLst>
+          </p:cNvPr>
+          <p:cNvSpPr txBox="1"/>
+          <p:nvPr/>
+        </p:nvSpPr>
+        <p:spPr>
+          <a:xfrm>
+            <a:off x="322378" y="195791"/>
+            <a:ext cx="2013626" cy="2308324"/>
+          </a:xfrm>
+          <a:prstGeom prst="rect">
+            <a:avLst/>
+          </a:prstGeom>
+          <a:solidFill>
+            <a:srgbClr val="FFFF00"/>
+          </a:solidFill>
+          <a:effectLst>
+            <a:outerShdw blurRad="50800" dist="38100" dir="2700000" algn="tl" rotWithShape="0">
+              <a:prstClr val="black">
+                <a:alpha val="40000"/>
+              </a:prstClr>
+            </a:outerShdw>
+          </a:effectLst>
+        </p:spPr>
+        <p:txBody>
+          <a:bodyPr wrap="square" rtlCol="0">
+            <a:spAutoFit/>
+          </a:bodyPr>
+          <a:lstStyle/>
+          <a:p>
+            <a:endParaRPr lang="es-ES" dirty="0"/>
+          </a:p>
+          <a:p>
+            <a:r>
+              <a:rPr lang="es-ES" dirty="0"/>
+              <a:t>Se mezclaran videos y fotos en los rectángulos</a:t>
+            </a:r>
+          </a:p>
+          <a:p>
+            <a:endParaRPr lang="es-ES" dirty="0"/>
+          </a:p>
+          <a:p>
+            <a:r>
+              <a:rPr lang="es-ES" dirty="0"/>
+              <a:t>Entrarán unas palabras y luego se irán</a:t>
+            </a:r>
+          </a:p>
+        </p:txBody>
+      </p:sp>
+      <p:pic>
+        <p:nvPicPr>
+          <p:cNvPr id="6" name="Gráfico 5" descr="Clip">
+            <a:extLst>
+              <a:ext uri="{FF2B5EF4-FFF2-40B4-BE49-F238E27FC236}">
+                <a16:creationId xmlns:a16="http://schemas.microsoft.com/office/drawing/2014/main" id="{9F6754B4-C9C9-4A6E-9A4F-C855EFD086DD}"/>
+              </a:ext>
+            </a:extLst>
+          </p:cNvPr>
+          <p:cNvPicPr>
+            <a:picLocks noChangeAspect="1"/>
+          </p:cNvPicPr>
+          <p:nvPr/>
+        </p:nvPicPr>
+        <p:blipFill>
+          <a:blip r:embed="rId2">
+            <a:extLst>
+              <a:ext uri="{28A0092B-C50C-407E-A947-70E740481C1C}">
+                <a14:useLocalDpi xmlns:a14="http://schemas.microsoft.com/office/drawing/2010/main" val="0"/>
+              </a:ext>
+              <a:ext uri="{96DAC541-7B7A-43D3-8B79-37D633B846F1}">
+                <asvg:svgBlip xmlns:asvg="http://schemas.microsoft.com/office/drawing/2016/SVG/main" r:embed="rId3"/>
+              </a:ext>
+            </a:extLst>
+          </a:blip>
+          <a:stretch>
+            <a:fillRect/>
+          </a:stretch>
+        </p:blipFill>
+        <p:spPr>
+          <a:xfrm>
+            <a:off x="741911" y="-366598"/>
+            <a:ext cx="914400" cy="914400"/>
+          </a:xfrm>
+          <a:prstGeom prst="rect">
+            <a:avLst/>
+          </a:prstGeom>
+        </p:spPr>
+      </p:pic>
+      <p:sp>
+        <p:nvSpPr>
+          <p:cNvPr id="8" name="CuadroTexto 7">
+            <a:extLst>
+              <a:ext uri="{FF2B5EF4-FFF2-40B4-BE49-F238E27FC236}">
+                <a16:creationId xmlns:a16="http://schemas.microsoft.com/office/drawing/2014/main" id="{E20DDDF8-5BA6-4AB5-9F85-E3271998AE3B}"/>
+              </a:ext>
+            </a:extLst>
+          </p:cNvPr>
+          <p:cNvSpPr txBox="1"/>
+          <p:nvPr/>
+        </p:nvSpPr>
+        <p:spPr>
+          <a:xfrm>
+            <a:off x="4363593" y="1974716"/>
+            <a:ext cx="4312862" cy="2215991"/>
+          </a:xfrm>
+          <a:prstGeom prst="rect">
+            <a:avLst/>
+          </a:prstGeom>
+          <a:noFill/>
+        </p:spPr>
+        <p:txBody>
+          <a:bodyPr wrap="square" rtlCol="0">
+            <a:spAutoFit/>
+          </a:bodyPr>
+          <a:lstStyle/>
+          <a:p>
+            <a:r>
+              <a:rPr lang="es-ES" sz="13800" dirty="0">
+                <a:solidFill>
+                  <a:schemeClr val="bg1"/>
+                </a:solidFill>
+                <a:effectLst>
+                  <a:outerShdw blurRad="38100" dist="38100" dir="2700000" algn="tl">
+                    <a:srgbClr val="000000">
+                      <a:alpha val="43137"/>
+                    </a:srgbClr>
+                  </a:outerShdw>
+                </a:effectLst>
+              </a:rPr>
+              <a:t>MAI</a:t>
+            </a:r>
+          </a:p>
+        </p:txBody>
+      </p:sp>
+      <p:sp>
+        <p:nvSpPr>
+          <p:cNvPr id="23" name="CuadroTexto 22">
+            <a:extLst>
+              <a:ext uri="{FF2B5EF4-FFF2-40B4-BE49-F238E27FC236}">
+                <a16:creationId xmlns:a16="http://schemas.microsoft.com/office/drawing/2014/main" id="{1F8DFEC2-2CFC-45D3-A1FE-9A4D4952FF33}"/>
+              </a:ext>
+            </a:extLst>
+          </p:cNvPr>
+          <p:cNvSpPr txBox="1"/>
+          <p:nvPr/>
+        </p:nvSpPr>
+        <p:spPr>
+          <a:xfrm>
+            <a:off x="4515993" y="2127116"/>
+            <a:ext cx="4312862" cy="2215991"/>
+          </a:xfrm>
+          <a:prstGeom prst="rect">
+            <a:avLst/>
+          </a:prstGeom>
+          <a:noFill/>
+        </p:spPr>
+        <p:txBody>
+          <a:bodyPr wrap="square" rtlCol="0">
+            <a:spAutoFit/>
+          </a:bodyPr>
+          <a:lstStyle/>
+          <a:p>
+            <a:r>
+              <a:rPr lang="es-ES" sz="13800" dirty="0">
+                <a:solidFill>
+                  <a:schemeClr val="bg1"/>
+                </a:solidFill>
+                <a:effectLst>
+                  <a:outerShdw blurRad="38100" dist="38100" dir="2700000" algn="tl">
+                    <a:srgbClr val="000000">
+                      <a:alpha val="43137"/>
+                    </a:srgbClr>
+                  </a:outerShdw>
+                </a:effectLst>
+              </a:rPr>
+              <a:t>MAI</a:t>
+            </a:r>
+          </a:p>
+        </p:txBody>
+      </p:sp>
     </p:spTree>
     <p:extLst>
       <p:ext uri="{BB962C8B-B14F-4D97-AF65-F5344CB8AC3E}">
         <p14:creationId xmlns:p14="http://schemas.microsoft.com/office/powerpoint/2010/main" val="266880398"/>
+      </p:ext>
+    </p:extLst>
+  </p:cSld>
+  <p:clrMapOvr>
+    <a:masterClrMapping/>
+  </p:clrMapOvr>
+</p:sld>
+</file>
+
+<file path=ppt/slides/slide2.xml><?xml version="1.0" encoding="utf-8"?>
+<p:sld xmlns:a="http://schemas.openxmlformats.org/drawingml/2006/main" xmlns:r="http://schemas.openxmlformats.org/officeDocument/2006/relationships" xmlns:p="http://schemas.openxmlformats.org/presentationml/2006/main">
+  <p:cSld>
+    <p:spTree>
+      <p:nvGrpSpPr>
+        <p:cNvPr id="1" name=""/>
+        <p:cNvGrpSpPr/>
+        <p:nvPr/>
+      </p:nvGrpSpPr>
+      <p:grpSpPr>
+        <a:xfrm>
+          <a:off x="0" y="0"/>
+          <a:ext cx="0" cy="0"/>
+          <a:chOff x="0" y="0"/>
+          <a:chExt cx="0" cy="0"/>
+        </a:xfrm>
+      </p:grpSpPr>
+      <p:pic>
+        <p:nvPicPr>
+          <p:cNvPr id="3" name="Imagen 2">
+            <a:extLst>
+              <a:ext uri="{FF2B5EF4-FFF2-40B4-BE49-F238E27FC236}">
+                <a16:creationId xmlns:a16="http://schemas.microsoft.com/office/drawing/2014/main" id="{F5F2A04A-8D41-4C48-9816-386F1448D505}"/>
+              </a:ext>
+            </a:extLst>
+          </p:cNvPr>
+          <p:cNvPicPr>
+            <a:picLocks noChangeAspect="1"/>
+          </p:cNvPicPr>
+          <p:nvPr/>
+        </p:nvPicPr>
+        <p:blipFill>
+          <a:blip r:embed="rId2"/>
+          <a:stretch>
+            <a:fillRect/>
+          </a:stretch>
+        </p:blipFill>
+        <p:spPr>
+          <a:xfrm>
+            <a:off x="0" y="185555"/>
+            <a:ext cx="12192000" cy="6486889"/>
+          </a:xfrm>
+          <a:prstGeom prst="rect">
+            <a:avLst/>
+          </a:prstGeom>
+        </p:spPr>
+      </p:pic>
+    </p:spTree>
+    <p:extLst>
+      <p:ext uri="{BB962C8B-B14F-4D97-AF65-F5344CB8AC3E}">
+        <p14:creationId xmlns:p14="http://schemas.microsoft.com/office/powerpoint/2010/main" val="2229508293"/>
+      </p:ext>
+    </p:extLst>
+  </p:cSld>
+  <p:clrMapOvr>
+    <a:masterClrMapping/>
+  </p:clrMapOvr>
+</p:sld>
+</file>
+
+<file path=ppt/slides/slide3.xml><?xml version="1.0" encoding="utf-8"?>
+<p:sld xmlns:a="http://schemas.openxmlformats.org/drawingml/2006/main" xmlns:r="http://schemas.openxmlformats.org/officeDocument/2006/relationships" xmlns:p="http://schemas.openxmlformats.org/presentationml/2006/main">
+  <p:cSld>
+    <p:spTree>
+      <p:nvGrpSpPr>
+        <p:cNvPr id="1" name=""/>
+        <p:cNvGrpSpPr/>
+        <p:nvPr/>
+      </p:nvGrpSpPr>
+      <p:grpSpPr>
+        <a:xfrm>
+          <a:off x="0" y="0"/>
+          <a:ext cx="0" cy="0"/>
+          <a:chOff x="0" y="0"/>
+          <a:chExt cx="0" cy="0"/>
+        </a:xfrm>
+      </p:grpSpPr>
+      <p:sp>
+        <p:nvSpPr>
+          <p:cNvPr id="3" name="CuadroTexto 2">
+            <a:extLst>
+              <a:ext uri="{FF2B5EF4-FFF2-40B4-BE49-F238E27FC236}">
+                <a16:creationId xmlns:a16="http://schemas.microsoft.com/office/drawing/2014/main" id="{7043C214-05A4-4605-9A3A-3C2C76CFBA33}"/>
+              </a:ext>
+            </a:extLst>
+          </p:cNvPr>
+          <p:cNvSpPr txBox="1"/>
+          <p:nvPr/>
+        </p:nvSpPr>
+        <p:spPr>
+          <a:xfrm>
+            <a:off x="3047189" y="3244334"/>
+            <a:ext cx="6094378" cy="369332"/>
+          </a:xfrm>
+          <a:prstGeom prst="rect">
+            <a:avLst/>
+          </a:prstGeom>
+          <a:noFill/>
+        </p:spPr>
+        <p:txBody>
+          <a:bodyPr wrap="square">
+            <a:spAutoFit/>
+          </a:bodyPr>
+          <a:lstStyle/>
+          <a:p>
+            <a:r>
+              <a:rPr lang="es-ES" dirty="0"/>
+              <a:t>https://kojo.com.au/</a:t>
+            </a:r>
+          </a:p>
+        </p:txBody>
+      </p:sp>
+    </p:spTree>
+    <p:extLst>
+      <p:ext uri="{BB962C8B-B14F-4D97-AF65-F5344CB8AC3E}">
+        <p14:creationId xmlns:p14="http://schemas.microsoft.com/office/powerpoint/2010/main" val="4206286501"/>
+      </p:ext>
+    </p:extLst>
+  </p:cSld>
+  <p:clrMapOvr>
+    <a:masterClrMapping/>
+  </p:clrMapOvr>
+</p:sld>
+</file>
+
+<file path=ppt/slides/slide4.xml><?xml version="1.0" encoding="utf-8"?>
+<p:sld xmlns:a="http://schemas.openxmlformats.org/drawingml/2006/main" xmlns:r="http://schemas.openxmlformats.org/officeDocument/2006/relationships" xmlns:p="http://schemas.openxmlformats.org/presentationml/2006/main">
+  <p:cSld>
+    <p:spTree>
+      <p:nvGrpSpPr>
+        <p:cNvPr id="1" name=""/>
+        <p:cNvGrpSpPr/>
+        <p:nvPr/>
+      </p:nvGrpSpPr>
+      <p:grpSpPr>
+        <a:xfrm>
+          <a:off x="0" y="0"/>
+          <a:ext cx="0" cy="0"/>
+          <a:chOff x="0" y="0"/>
+          <a:chExt cx="0" cy="0"/>
+        </a:xfrm>
+      </p:grpSpPr>
+      <p:pic>
+        <p:nvPicPr>
+          <p:cNvPr id="3" name="Imagen 2">
+            <a:extLst>
+              <a:ext uri="{FF2B5EF4-FFF2-40B4-BE49-F238E27FC236}">
+                <a16:creationId xmlns:a16="http://schemas.microsoft.com/office/drawing/2014/main" id="{B6096502-2A9C-45CA-8873-1D77929A210E}"/>
+              </a:ext>
+            </a:extLst>
+          </p:cNvPr>
+          <p:cNvPicPr>
+            <a:picLocks noChangeAspect="1"/>
+          </p:cNvPicPr>
+          <p:nvPr/>
+        </p:nvPicPr>
+        <p:blipFill>
+          <a:blip r:embed="rId2"/>
+          <a:stretch>
+            <a:fillRect/>
+          </a:stretch>
+        </p:blipFill>
+        <p:spPr>
+          <a:xfrm>
+            <a:off x="0" y="441423"/>
+            <a:ext cx="12192000" cy="5975154"/>
+          </a:xfrm>
+          <a:prstGeom prst="rect">
+            <a:avLst/>
+          </a:prstGeom>
+        </p:spPr>
+      </p:pic>
+    </p:spTree>
+    <p:extLst>
+      <p:ext uri="{BB962C8B-B14F-4D97-AF65-F5344CB8AC3E}">
+        <p14:creationId xmlns:p14="http://schemas.microsoft.com/office/powerpoint/2010/main" val="813271363"/>
       </p:ext>
     </p:extLst>
   </p:cSld>

</xml_diff>